<commit_message>
updated status slide with architecture picture
</commit_message>
<xml_diff>
--- a/presentations/slides-117-anima-update-brski-with-pledge-in-responder-mode-brski-prm.pptx
+++ b/presentations/slides-117-anima-update-brski-with-pledge-in-responder-mode-brski-prm.pptx
@@ -9,7 +9,7 @@
   </p:notesMasterIdLst>
   <p:sldIdLst>
     <p:sldId id="310" r:id="rId2"/>
-    <p:sldId id="321" r:id="rId3"/>
+    <p:sldId id="322" r:id="rId3"/>
     <p:sldId id="319" r:id="rId4"/>
     <p:sldId id="311" r:id="rId5"/>
     <p:sldId id="285" r:id="rId6"/>
@@ -235,7 +235,7 @@
           <a:p>
             <a:fld id="{33B5B5E8-CA78-4A82-83A0-867EF5A818AE}" type="datetimeFigureOut">
               <a:rPr lang="en-US" smtClean="0"/>
-              <a:t>7/6/2023</a:t>
+              <a:t>7/14/2023</a:t>
             </a:fld>
             <a:endParaRPr lang="en-US"/>
           </a:p>
@@ -576,7 +576,7 @@
     </p:spTree>
     <p:extLst>
       <p:ext uri="{BB962C8B-B14F-4D97-AF65-F5344CB8AC3E}">
-        <p14:creationId xmlns:p14="http://schemas.microsoft.com/office/powerpoint/2010/main" val="4097242608"/>
+        <p14:creationId xmlns:p14="http://schemas.microsoft.com/office/powerpoint/2010/main" val="2822548124"/>
       </p:ext>
     </p:extLst>
   </p:cSld>
@@ -993,7 +993,7 @@
           <a:p>
             <a:fld id="{8C792E63-5F21-4F54-A864-D84D9F273FCA}" type="datetimeFigureOut">
               <a:rPr lang="en-US" smtClean="0"/>
-              <a:t>7/6/2023</a:t>
+              <a:t>7/14/2023</a:t>
             </a:fld>
             <a:endParaRPr lang="en-US" dirty="0"/>
           </a:p>
@@ -1211,7 +1211,7 @@
           <a:p>
             <a:fld id="{8C792E63-5F21-4F54-A864-D84D9F273FCA}" type="datetimeFigureOut">
               <a:rPr lang="en-US" smtClean="0"/>
-              <a:t>7/6/2023</a:t>
+              <a:t>7/14/2023</a:t>
             </a:fld>
             <a:endParaRPr lang="en-US"/>
           </a:p>
@@ -1435,7 +1435,7 @@
           <a:p>
             <a:fld id="{8C792E63-5F21-4F54-A864-D84D9F273FCA}" type="datetimeFigureOut">
               <a:rPr lang="en-US" smtClean="0"/>
-              <a:t>7/6/2023</a:t>
+              <a:t>7/14/2023</a:t>
             </a:fld>
             <a:endParaRPr lang="en-US"/>
           </a:p>
@@ -1649,7 +1649,7 @@
           <a:p>
             <a:fld id="{8C792E63-5F21-4F54-A864-D84D9F273FCA}" type="datetimeFigureOut">
               <a:rPr lang="en-US" smtClean="0"/>
-              <a:t>7/6/2023</a:t>
+              <a:t>7/14/2023</a:t>
             </a:fld>
             <a:endParaRPr lang="en-US"/>
           </a:p>
@@ -1940,7 +1940,7 @@
           <a:p>
             <a:fld id="{8C792E63-5F21-4F54-A864-D84D9F273FCA}" type="datetimeFigureOut">
               <a:rPr lang="en-US" smtClean="0"/>
-              <a:t>7/6/2023</a:t>
+              <a:t>7/14/2023</a:t>
             </a:fld>
             <a:endParaRPr lang="en-US"/>
           </a:p>
@@ -2221,7 +2221,7 @@
           <a:p>
             <a:fld id="{8C792E63-5F21-4F54-A864-D84D9F273FCA}" type="datetimeFigureOut">
               <a:rPr lang="en-US" smtClean="0"/>
-              <a:t>7/6/2023</a:t>
+              <a:t>7/14/2023</a:t>
             </a:fld>
             <a:endParaRPr lang="en-US"/>
           </a:p>
@@ -2649,7 +2649,7 @@
           <a:p>
             <a:fld id="{8C792E63-5F21-4F54-A864-D84D9F273FCA}" type="datetimeFigureOut">
               <a:rPr lang="en-US" smtClean="0"/>
-              <a:t>7/6/2023</a:t>
+              <a:t>7/14/2023</a:t>
             </a:fld>
             <a:endParaRPr lang="en-US"/>
           </a:p>
@@ -2806,7 +2806,7 @@
           <a:p>
             <a:fld id="{8C792E63-5F21-4F54-A864-D84D9F273FCA}" type="datetimeFigureOut">
               <a:rPr lang="en-US" smtClean="0"/>
-              <a:t>7/6/2023</a:t>
+              <a:t>7/14/2023</a:t>
             </a:fld>
             <a:endParaRPr lang="en-US"/>
           </a:p>
@@ -2935,7 +2935,7 @@
           <a:p>
             <a:fld id="{8C792E63-5F21-4F54-A864-D84D9F273FCA}" type="datetimeFigureOut">
               <a:rPr lang="en-US" smtClean="0"/>
-              <a:t>7/6/2023</a:t>
+              <a:t>7/14/2023</a:t>
             </a:fld>
             <a:endParaRPr lang="en-US"/>
           </a:p>
@@ -3262,7 +3262,7 @@
           <a:p>
             <a:fld id="{8C792E63-5F21-4F54-A864-D84D9F273FCA}" type="datetimeFigureOut">
               <a:rPr lang="en-US" smtClean="0"/>
-              <a:t>7/6/2023</a:t>
+              <a:t>7/14/2023</a:t>
             </a:fld>
             <a:endParaRPr lang="en-US"/>
           </a:p>
@@ -3566,7 +3566,7 @@
           <a:p>
             <a:fld id="{8C792E63-5F21-4F54-A864-D84D9F273FCA}" type="datetimeFigureOut">
               <a:rPr lang="en-US" smtClean="0"/>
-              <a:t>7/6/2023</a:t>
+              <a:t>7/14/2023</a:t>
             </a:fld>
             <a:endParaRPr lang="en-US"/>
           </a:p>
@@ -3858,7 +3858,7 @@
           <a:p>
             <a:fld id="{8C792E63-5F21-4F54-A864-D84D9F273FCA}" type="datetimeFigureOut">
               <a:rPr lang="en-US" smtClean="0"/>
-              <a:t>7/6/2023</a:t>
+              <a:t>7/14/2023</a:t>
             </a:fld>
             <a:endParaRPr lang="en-US"/>
           </a:p>
@@ -4495,8 +4495,8 @@
         </p:nvSpPr>
         <p:spPr>
           <a:xfrm>
-            <a:off x="838199" y="1752406"/>
-            <a:ext cx="10925433" cy="4542226"/>
+            <a:off x="838199" y="1946991"/>
+            <a:ext cx="10882745" cy="4542226"/>
           </a:xfrm>
         </p:spPr>
         <p:txBody>
@@ -4521,7 +4521,21 @@
             </a:pPr>
             <a:r>
               <a:rPr lang="en-US" sz="2200" dirty="0"/>
-              <a:t>After WGLC in March 2023 most of the open issues have been addressed. Most of them resulted in structural improvements as well as further clarifications in the text and the figures and also negative examples for message processing. </a:t>
+              <a:t>Addressed almost all issues from WGLC in March 2023. </a:t>
+            </a:r>
+            <a:br>
+              <a:rPr lang="en-US" sz="2200" dirty="0"/>
+            </a:br>
+            <a:r>
+              <a:rPr lang="en-US" sz="2200" dirty="0"/>
+              <a:t>Most resulted in structural improvements, clarifications </a:t>
+            </a:r>
+            <a:br>
+              <a:rPr lang="en-US" sz="2200" dirty="0"/>
+            </a:br>
+            <a:r>
+              <a:rPr lang="en-US" sz="2200" dirty="0"/>
+              <a:t>in the text and the figures and additional examples. </a:t>
             </a:r>
           </a:p>
           <a:p>
@@ -4541,7 +4555,7 @@
             </a:pPr>
             <a:r>
               <a:rPr lang="en-US" sz="2200" dirty="0"/>
-              <a:t>Technical comments related to the following</a:t>
+              <a:t>Technical comments related to the following </a:t>
             </a:r>
           </a:p>
           <a:p>
@@ -4560,7 +4574,7 @@
                 </a:solidFill>
                 <a:effectLst/>
               </a:rPr>
-              <a:t>Support for optional TLS protection of the communication link between registrar-agent and pledge (</a:t>
+              <a:t>Support of optional TLS protection of the communication link between registrar-agent and pledge (</a:t>
             </a:r>
             <a:r>
               <a:rPr lang="en-US" sz="2200" b="0" i="0" u="none" strike="noStrike" dirty="0">
@@ -4625,7 +4639,7 @@
                   <a:srgbClr val="222222"/>
                 </a:solidFill>
               </a:rPr>
-              <a:t>This addresses several issues and also related to changes in the Privacy Considerations and the Security Considerations. </a:t>
+              <a:t>This addresses several privacy related issues and also added in the Privacy and Security Considerations. </a:t>
             </a:r>
           </a:p>
           <a:p>
@@ -4644,7 +4658,7 @@
                 </a:solidFill>
                 <a:effectLst/>
               </a:rPr>
-              <a:t>Included options that a separate HTTP connection may also be used to provide the PER (</a:t>
+              <a:t>Included option that a separate HTTP connection may also be used to provide the PER (</a:t>
             </a:r>
             <a:r>
               <a:rPr lang="en-US" sz="2200" b="0" i="0" u="none" strike="noStrike" dirty="0">
@@ -4654,17 +4668,7 @@
                 <a:effectLst/>
                 <a:hlinkClick r:id="rId6" action="ppaction://hlinkfile"/>
               </a:rPr>
-              <a:t>S</a:t>
-            </a:r>
-            <a:r>
-              <a:rPr lang="en-US" sz="2200" b="0" i="0" u="none" strike="noStrike" dirty="0">
-                <a:solidFill>
-                  <a:srgbClr val="2222EE"/>
-                </a:solidFill>
-                <a:effectLst/>
-                <a:hlinkClick r:id="rId6" action="ppaction://hlinkfile"/>
-              </a:rPr>
-              <a:t>ection 6.2.6</a:t>
+              <a:t>Section 6.2.6</a:t>
             </a:r>
             <a:r>
               <a:rPr lang="en-US" sz="2200" b="0" i="0" u="none" strike="noStrike" dirty="0">
@@ -4873,7 +4877,7 @@
             <a:fld id="{8C792E63-5F21-4F54-A864-D84D9F273FCA}" type="datetimeFigureOut">
               <a:rPr lang="en-US" smtClean="0"/>
               <a:pPr/>
-              <a:t>7/11/2023</a:t>
+              <a:t>7/14/2023</a:t>
             </a:fld>
             <a:endParaRPr lang="en-US" dirty="0"/>
           </a:p>
@@ -5011,10 +5015,40 @@
           </a:p>
         </p:txBody>
       </p:sp>
+      <p:pic>
+        <p:nvPicPr>
+          <p:cNvPr id="6" name="Picture 5">
+            <a:extLst>
+              <a:ext uri="{FF2B5EF4-FFF2-40B4-BE49-F238E27FC236}">
+                <a16:creationId xmlns:a16="http://schemas.microsoft.com/office/drawing/2014/main" id="{F67FE8F2-52EC-3F82-0F71-3D7E1DDDC617}"/>
+              </a:ext>
+            </a:extLst>
+          </p:cNvPr>
+          <p:cNvPicPr>
+            <a:picLocks noChangeAspect="1"/>
+          </p:cNvPicPr>
+          <p:nvPr/>
+        </p:nvPicPr>
+        <p:blipFill>
+          <a:blip r:embed="rId7"/>
+          <a:stretch>
+            <a:fillRect/>
+          </a:stretch>
+        </p:blipFill>
+        <p:spPr>
+          <a:xfrm>
+            <a:off x="8316191" y="49745"/>
+            <a:ext cx="3571515" cy="3538189"/>
+          </a:xfrm>
+          <a:prstGeom prst="rect">
+            <a:avLst/>
+          </a:prstGeom>
+        </p:spPr>
+      </p:pic>
     </p:spTree>
     <p:extLst>
       <p:ext uri="{BB962C8B-B14F-4D97-AF65-F5344CB8AC3E}">
-        <p14:creationId xmlns:p14="http://schemas.microsoft.com/office/powerpoint/2010/main" val="2108370939"/>
+        <p14:creationId xmlns:p14="http://schemas.microsoft.com/office/powerpoint/2010/main" val="708985953"/>
       </p:ext>
     </p:extLst>
   </p:cSld>
@@ -5548,7 +5582,7 @@
             <a:fld id="{8C792E63-5F21-4F54-A864-D84D9F273FCA}" type="datetimeFigureOut">
               <a:rPr lang="en-US" smtClean="0"/>
               <a:pPr/>
-              <a:t>7/12/2023</a:t>
+              <a:t>7/14/2023</a:t>
             </a:fld>
             <a:endParaRPr lang="en-US" dirty="0"/>
           </a:p>
@@ -6025,7 +6059,7 @@
             <a:fld id="{8C792E63-5F21-4F54-A864-D84D9F273FCA}" type="datetimeFigureOut">
               <a:rPr lang="en-US" smtClean="0"/>
               <a:pPr/>
-              <a:t>7/12/2023</a:t>
+              <a:t>7/14/2023</a:t>
             </a:fld>
             <a:endParaRPr lang="en-US" dirty="0"/>
           </a:p>

</xml_diff>